<commit_message>
Added Developer Guide for Mark and Unmark feature, and edited Developer Guide for Delete feature
</commit_message>
<xml_diff>
--- a/docs/Delete.pptx
+++ b/docs/Delete.pptx
@@ -126,6 +126,155 @@
 </p:presentation>
 </file>
 
+<file path=ppt/revisionInfo.xml><?xml version="1.0" encoding="utf-8"?>
+<p1510:revInfo xmlns:a="http://schemas.openxmlformats.org/drawingml/2006/main" xmlns:r="http://schemas.openxmlformats.org/officeDocument/2006/relationships" xmlns:p1510="http://schemas.microsoft.com/office/powerpoint/2015/10/main">
+  <p1510:revLst>
+    <p1510:client id="{8FAF00C3-F61C-42E2-99A3-FBCBDDBEE570}" v="5" dt="2020-03-23T06:24:15.579"/>
+  </p1510:revLst>
+</p1510:revInfo>
+</file>
+
+<file path=ppt/changesInfos/changesInfo1.xml><?xml version="1.0" encoding="utf-8"?>
+<pc:chgInfo xmlns:a="http://schemas.openxmlformats.org/drawingml/2006/main" xmlns:r="http://schemas.openxmlformats.org/officeDocument/2006/relationships" xmlns:ac="http://schemas.microsoft.com/office/drawing/2013/main/command" xmlns:pc="http://schemas.microsoft.com/office/powerpoint/2013/main/command">
+  <pc:docChgLst>
+    <pc:chgData name="Shannon Wong" userId="8c83f3d3550a5322" providerId="LiveId" clId="{8FAF00C3-F61C-42E2-99A3-FBCBDDBEE570}"/>
+    <pc:docChg chg="undo modSld">
+      <pc:chgData name="Shannon Wong" userId="8c83f3d3550a5322" providerId="LiveId" clId="{8FAF00C3-F61C-42E2-99A3-FBCBDDBEE570}" dt="2020-03-23T06:36:26.913" v="23" actId="1035"/>
+      <pc:docMkLst>
+        <pc:docMk/>
+      </pc:docMkLst>
+      <pc:sldChg chg="modSp">
+        <pc:chgData name="Shannon Wong" userId="8c83f3d3550a5322" providerId="LiveId" clId="{8FAF00C3-F61C-42E2-99A3-FBCBDDBEE570}" dt="2020-03-23T06:36:26.913" v="23" actId="1035"/>
+        <pc:sldMkLst>
+          <pc:docMk/>
+          <pc:sldMk cId="3228498101" sldId="269"/>
+        </pc:sldMkLst>
+        <pc:spChg chg="mod">
+          <ac:chgData name="Shannon Wong" userId="8c83f3d3550a5322" providerId="LiveId" clId="{8FAF00C3-F61C-42E2-99A3-FBCBDDBEE570}" dt="2020-03-23T06:24:37.714" v="13" actId="1038"/>
+          <ac:spMkLst>
+            <pc:docMk/>
+            <pc:sldMk cId="3228498101" sldId="269"/>
+            <ac:spMk id="18" creationId="{00000000-0000-0000-0000-000000000000}"/>
+          </ac:spMkLst>
+        </pc:spChg>
+        <pc:spChg chg="mod">
+          <ac:chgData name="Shannon Wong" userId="8c83f3d3550a5322" providerId="LiveId" clId="{8FAF00C3-F61C-42E2-99A3-FBCBDDBEE570}" dt="2020-03-23T06:24:37.714" v="13" actId="1038"/>
+          <ac:spMkLst>
+            <pc:docMk/>
+            <pc:sldMk cId="3228498101" sldId="269"/>
+            <ac:spMk id="21" creationId="{00000000-0000-0000-0000-000000000000}"/>
+          </ac:spMkLst>
+        </pc:spChg>
+        <pc:spChg chg="mod">
+          <ac:chgData name="Shannon Wong" userId="8c83f3d3550a5322" providerId="LiveId" clId="{8FAF00C3-F61C-42E2-99A3-FBCBDDBEE570}" dt="2020-03-23T06:24:58.011" v="14" actId="14100"/>
+          <ac:spMkLst>
+            <pc:docMk/>
+            <pc:sldMk cId="3228498101" sldId="269"/>
+            <ac:spMk id="24" creationId="{00000000-0000-0000-0000-000000000000}"/>
+          </ac:spMkLst>
+        </pc:spChg>
+        <pc:spChg chg="mod">
+          <ac:chgData name="Shannon Wong" userId="8c83f3d3550a5322" providerId="LiveId" clId="{8FAF00C3-F61C-42E2-99A3-FBCBDDBEE570}" dt="2020-03-23T06:24:37.714" v="13" actId="1038"/>
+          <ac:spMkLst>
+            <pc:docMk/>
+            <pc:sldMk cId="3228498101" sldId="269"/>
+            <ac:spMk id="33" creationId="{00000000-0000-0000-0000-000000000000}"/>
+          </ac:spMkLst>
+        </pc:spChg>
+        <pc:spChg chg="mod">
+          <ac:chgData name="Shannon Wong" userId="8c83f3d3550a5322" providerId="LiveId" clId="{8FAF00C3-F61C-42E2-99A3-FBCBDDBEE570}" dt="2020-03-23T06:36:26.913" v="23" actId="1035"/>
+          <ac:spMkLst>
+            <pc:docMk/>
+            <pc:sldMk cId="3228498101" sldId="269"/>
+            <ac:spMk id="38" creationId="{00000000-0000-0000-0000-000000000000}"/>
+          </ac:spMkLst>
+        </pc:spChg>
+        <pc:spChg chg="mod">
+          <ac:chgData name="Shannon Wong" userId="8c83f3d3550a5322" providerId="LiveId" clId="{8FAF00C3-F61C-42E2-99A3-FBCBDDBEE570}" dt="2020-03-23T06:24:37.714" v="13" actId="1038"/>
+          <ac:spMkLst>
+            <pc:docMk/>
+            <pc:sldMk cId="3228498101" sldId="269"/>
+            <ac:spMk id="40" creationId="{00000000-0000-0000-0000-000000000000}"/>
+          </ac:spMkLst>
+        </pc:spChg>
+        <pc:spChg chg="mod">
+          <ac:chgData name="Shannon Wong" userId="8c83f3d3550a5322" providerId="LiveId" clId="{8FAF00C3-F61C-42E2-99A3-FBCBDDBEE570}" dt="2020-03-23T06:24:37.714" v="13" actId="1038"/>
+          <ac:spMkLst>
+            <pc:docMk/>
+            <pc:sldMk cId="3228498101" sldId="269"/>
+            <ac:spMk id="42" creationId="{569EC1FF-3CDF-4E6B-82B3-104CCA3F3E9D}"/>
+          </ac:spMkLst>
+        </pc:spChg>
+        <pc:spChg chg="mod">
+          <ac:chgData name="Shannon Wong" userId="8c83f3d3550a5322" providerId="LiveId" clId="{8FAF00C3-F61C-42E2-99A3-FBCBDDBEE570}" dt="2020-03-23T06:25:48.793" v="20" actId="14100"/>
+          <ac:spMkLst>
+            <pc:docMk/>
+            <pc:sldMk cId="3228498101" sldId="269"/>
+            <ac:spMk id="45" creationId="{0EB24DA8-2498-4853-AED4-3458A81C456A}"/>
+          </ac:spMkLst>
+        </pc:spChg>
+        <pc:spChg chg="mod">
+          <ac:chgData name="Shannon Wong" userId="8c83f3d3550a5322" providerId="LiveId" clId="{8FAF00C3-F61C-42E2-99A3-FBCBDDBEE570}" dt="2020-03-23T06:24:37.714" v="13" actId="1038"/>
+          <ac:spMkLst>
+            <pc:docMk/>
+            <pc:sldMk cId="3228498101" sldId="269"/>
+            <ac:spMk id="46" creationId="{9BC66A45-C94A-4E62-8981-39EC5DACDD6D}"/>
+          </ac:spMkLst>
+        </pc:spChg>
+        <pc:spChg chg="mod">
+          <ac:chgData name="Shannon Wong" userId="8c83f3d3550a5322" providerId="LiveId" clId="{8FAF00C3-F61C-42E2-99A3-FBCBDDBEE570}" dt="2020-03-23T06:24:15.578" v="4" actId="20577"/>
+          <ac:spMkLst>
+            <pc:docMk/>
+            <pc:sldMk cId="3228498101" sldId="269"/>
+            <ac:spMk id="47" creationId="{342B431E-151F-4A55-A1AE-57F6FE56D1EF}"/>
+          </ac:spMkLst>
+        </pc:spChg>
+        <pc:spChg chg="mod">
+          <ac:chgData name="Shannon Wong" userId="8c83f3d3550a5322" providerId="LiveId" clId="{8FAF00C3-F61C-42E2-99A3-FBCBDDBEE570}" dt="2020-03-23T06:25:35.646" v="19" actId="1035"/>
+          <ac:spMkLst>
+            <pc:docMk/>
+            <pc:sldMk cId="3228498101" sldId="269"/>
+            <ac:spMk id="51" creationId="{34020A70-184B-4A57-816D-CCE686742C10}"/>
+          </ac:spMkLst>
+        </pc:spChg>
+        <pc:spChg chg="mod">
+          <ac:chgData name="Shannon Wong" userId="8c83f3d3550a5322" providerId="LiveId" clId="{8FAF00C3-F61C-42E2-99A3-FBCBDDBEE570}" dt="2020-03-23T06:24:37.714" v="13" actId="1038"/>
+          <ac:spMkLst>
+            <pc:docMk/>
+            <pc:sldMk cId="3228498101" sldId="269"/>
+            <ac:spMk id="52" creationId="{C30F3633-BE5D-441D-9C87-D00C0DFC3E6D}"/>
+          </ac:spMkLst>
+        </pc:spChg>
+        <pc:spChg chg="mod">
+          <ac:chgData name="Shannon Wong" userId="8c83f3d3550a5322" providerId="LiveId" clId="{8FAF00C3-F61C-42E2-99A3-FBCBDDBEE570}" dt="2020-03-23T06:24:37.714" v="13" actId="1038"/>
+          <ac:spMkLst>
+            <pc:docMk/>
+            <pc:sldMk cId="3228498101" sldId="269"/>
+            <ac:spMk id="53" creationId="{E7397DF1-A503-43B8-9D46-710440F45D61}"/>
+          </ac:spMkLst>
+        </pc:spChg>
+        <pc:cxnChg chg="mod">
+          <ac:chgData name="Shannon Wong" userId="8c83f3d3550a5322" providerId="LiveId" clId="{8FAF00C3-F61C-42E2-99A3-FBCBDDBEE570}" dt="2020-03-23T06:24:37.714" v="13" actId="1038"/>
+          <ac:cxnSpMkLst>
+            <pc:docMk/>
+            <pc:sldMk cId="3228498101" sldId="269"/>
+            <ac:cxnSpMk id="54" creationId="{BB6AEF2A-70C0-4C86-ACC0-ED4823D6AC46}"/>
+          </ac:cxnSpMkLst>
+        </pc:cxnChg>
+        <pc:cxnChg chg="mod">
+          <ac:chgData name="Shannon Wong" userId="8c83f3d3550a5322" providerId="LiveId" clId="{8FAF00C3-F61C-42E2-99A3-FBCBDDBEE570}" dt="2020-03-23T06:24:37.714" v="13" actId="1038"/>
+          <ac:cxnSpMkLst>
+            <pc:docMk/>
+            <pc:sldMk cId="3228498101" sldId="269"/>
+            <ac:cxnSpMk id="55" creationId="{9664B067-90B9-447F-947E-62F78A316229}"/>
+          </ac:cxnSpMkLst>
+        </pc:cxnChg>
+      </pc:sldChg>
+    </pc:docChg>
+  </pc:docChgLst>
+</pc:chgInfo>
+</file>
+
 <file path=ppt/notesMasters/notesMaster1.xml><?xml version="1.0" encoding="utf-8"?>
 <p:notesMaster xmlns:a="http://schemas.openxmlformats.org/drawingml/2006/main" xmlns:r="http://schemas.openxmlformats.org/officeDocument/2006/relationships" xmlns:p="http://schemas.openxmlformats.org/presentationml/2006/main">
   <p:cSld>
@@ -208,7 +357,7 @@
           <a:p>
             <a:fld id="{9629A0FB-7277-41B0-BEC2-EE35F8B0CE39}" type="datetimeFigureOut">
               <a:rPr lang="en-SG" smtClean="0"/>
-              <a:t>21/3/2020</a:t>
+              <a:t>23/3/2020</a:t>
             </a:fld>
             <a:endParaRPr lang="en-SG"/>
           </a:p>
@@ -4011,7 +4160,7 @@
         </p:nvSpPr>
         <p:spPr bwMode="auto">
           <a:xfrm>
-            <a:off x="4822622" y="2812540"/>
+            <a:off x="5294250" y="2812540"/>
             <a:ext cx="1596653" cy="600164"/>
           </a:xfrm>
           <a:prstGeom prst="rect">
@@ -4176,7 +4325,7 @@
         </p:nvSpPr>
         <p:spPr bwMode="auto">
           <a:xfrm>
-            <a:off x="6061453" y="4044402"/>
+            <a:off x="6533081" y="4044402"/>
             <a:ext cx="1584515" cy="323165"/>
           </a:xfrm>
           <a:prstGeom prst="rect">
@@ -4224,8 +4373,8 @@
         </p:nvSpPr>
         <p:spPr bwMode="auto">
           <a:xfrm flipV="1">
-            <a:off x="3194466" y="3132154"/>
-            <a:ext cx="1628156" cy="7946"/>
+            <a:off x="3194466" y="3109931"/>
+            <a:ext cx="2099784" cy="30169"/>
           </a:xfrm>
           <a:prstGeom prst="line">
             <a:avLst/>
@@ -4370,7 +4519,7 @@
         </p:nvSpPr>
         <p:spPr bwMode="auto">
           <a:xfrm flipH="1">
-            <a:off x="5600337" y="3396473"/>
+            <a:off x="6071965" y="3396473"/>
             <a:ext cx="4560" cy="1893221"/>
           </a:xfrm>
           <a:prstGeom prst="line">
@@ -4463,7 +4612,7 @@
         </p:nvSpPr>
         <p:spPr bwMode="auto">
           <a:xfrm>
-            <a:off x="1211846" y="1521173"/>
+            <a:off x="1211846" y="1600200"/>
             <a:ext cx="1182981" cy="323165"/>
           </a:xfrm>
           <a:prstGeom prst="rect">
@@ -4505,7 +4654,7 @@
         </p:nvSpPr>
         <p:spPr>
           <a:xfrm>
-            <a:off x="5474656" y="4066313"/>
+            <a:off x="5946284" y="4066313"/>
             <a:ext cx="251361" cy="878804"/>
           </a:xfrm>
           <a:prstGeom prst="rect">
@@ -4568,7 +4717,7 @@
         </p:nvSpPr>
         <p:spPr bwMode="auto">
           <a:xfrm>
-            <a:off x="6995972" y="3112622"/>
+            <a:off x="7467600" y="3112622"/>
             <a:ext cx="1676400" cy="600164"/>
           </a:xfrm>
           <a:prstGeom prst="rect">
@@ -4786,8 +4935,8 @@
         </p:nvSpPr>
         <p:spPr bwMode="auto">
           <a:xfrm flipV="1">
-            <a:off x="875317" y="4058368"/>
-            <a:ext cx="4588585" cy="7945"/>
+            <a:off x="875317" y="4066312"/>
+            <a:ext cx="5069986" cy="0"/>
           </a:xfrm>
           <a:prstGeom prst="line">
             <a:avLst/>
@@ -4833,7 +4982,7 @@
         </p:nvSpPr>
         <p:spPr bwMode="auto">
           <a:xfrm>
-            <a:off x="5726017" y="4367567"/>
+            <a:off x="6197645" y="4367567"/>
             <a:ext cx="1970403" cy="11401"/>
           </a:xfrm>
           <a:prstGeom prst="line">
@@ -4913,7 +5062,7 @@
             </a:r>
             <a:r>
               <a:rPr lang="en-US" sz="1500" i="1" dirty="0"/>
-              <a:t>()</a:t>
+              <a:t>(index)</a:t>
             </a:r>
           </a:p>
         </p:txBody>
@@ -5066,7 +5215,7 @@
         </p:nvSpPr>
         <p:spPr bwMode="auto">
           <a:xfrm>
-            <a:off x="3799306" y="3818580"/>
+            <a:off x="3799306" y="3733800"/>
             <a:ext cx="886908" cy="323165"/>
           </a:xfrm>
           <a:prstGeom prst="rect">
@@ -5116,7 +5265,7 @@
         </p:nvSpPr>
         <p:spPr bwMode="auto">
           <a:xfrm>
-            <a:off x="7827643" y="3740237"/>
+            <a:off x="8299271" y="3740237"/>
             <a:ext cx="0" cy="1605048"/>
           </a:xfrm>
           <a:prstGeom prst="line">
@@ -5174,7 +5323,7 @@
         </p:nvSpPr>
         <p:spPr>
           <a:xfrm>
-            <a:off x="7701963" y="4367567"/>
+            <a:off x="8173591" y="4367567"/>
             <a:ext cx="251361" cy="697392"/>
           </a:xfrm>
           <a:prstGeom prst="rect">
@@ -5234,7 +5383,7 @@
         </p:nvCxnSpPr>
         <p:spPr>
           <a:xfrm rot="16200000" flipV="1">
-            <a:off x="5455516" y="5196333"/>
+            <a:off x="5927144" y="5196333"/>
             <a:ext cx="284430" cy="267655"/>
           </a:xfrm>
           <a:prstGeom prst="line">
@@ -5277,7 +5426,7 @@
         </p:nvCxnSpPr>
         <p:spPr>
           <a:xfrm rot="5400000">
-            <a:off x="5448926" y="5200827"/>
+            <a:off x="5920554" y="5200827"/>
             <a:ext cx="288175" cy="266007"/>
           </a:xfrm>
           <a:prstGeom prst="line">

</xml_diff>

<commit_message>
Finalize sizing of diagram
</commit_message>
<xml_diff>
--- a/docs/Delete.pptx
+++ b/docs/Delete.pptx
@@ -5519,8 +5519,8 @@
         </p:nvSpPr>
         <p:spPr bwMode="auto">
           <a:xfrm flipH="1" flipV="1">
-            <a:off x="6205419" y="5045147"/>
-            <a:ext cx="1962628" cy="5529"/>
+            <a:off x="6197600" y="5052291"/>
+            <a:ext cx="1961344" cy="8186"/>
           </a:xfrm>
           <a:prstGeom prst="line">
             <a:avLst/>

</xml_diff>

<commit_message>
Edit UG and DG
</commit_message>
<xml_diff>
--- a/docs/Delete.pptx
+++ b/docs/Delete.pptx
@@ -357,7 +357,7 @@
           <a:p>
             <a:fld id="{9629A0FB-7277-41B0-BEC2-EE35F8B0CE39}" type="datetimeFigureOut">
               <a:rPr lang="en-SG" smtClean="0"/>
-              <a:t>24/3/2020</a:t>
+              <a:t>27/3/2020</a:t>
             </a:fld>
             <a:endParaRPr lang="en-SG"/>
           </a:p>
@@ -4853,8 +4853,21 @@
                   <a:prstClr val="black"/>
                 </a:solidFill>
               </a:rPr>
-              <a:t>:Duke</a:t>
-            </a:r>
+              <a:t>:</a:t>
+            </a:r>
+            <a:r>
+              <a:rPr lang="en-US" sz="1500" dirty="0" err="1">
+                <a:solidFill>
+                  <a:prstClr val="black"/>
+                </a:solidFill>
+              </a:rPr>
+              <a:t>Shoco</a:t>
+            </a:r>
+            <a:endParaRPr lang="en-US" sz="1500" dirty="0">
+              <a:solidFill>
+                <a:prstClr val="black"/>
+              </a:solidFill>
+            </a:endParaRPr>
           </a:p>
         </p:txBody>
       </p:sp>

</xml_diff>